<commit_message>
Init Upload Version v0.2
</commit_message>
<xml_diff>
--- a/log.pptx
+++ b/log.pptx
@@ -19,11 +19,15 @@
     <p:sldId id="267" r:id="rId14"/>
     <p:sldId id="268" r:id="rId15"/>
     <p:sldId id="269" r:id="rId16"/>
+    <p:sldId id="270" r:id="rId17"/>
+    <p:sldId id="271" r:id="rId18"/>
+    <p:sldId id="272" r:id="rId19"/>
+    <p:sldId id="273" r:id="rId20"/>
   </p:sldIdLst>
   <p:sldSz cx="12192000" cy="6858000"/>
   <p:notesSz cx="6858000" cy="9144000"/>
   <p:custDataLst>
-    <p:tags r:id="rId20"/>
+    <p:tags r:id="rId24"/>
   </p:custDataLst>
   <p:defaultTextStyle>
     <a:defPPr>
@@ -3406,6 +3410,280 @@
 </p:sld>
 </file>
 
+<file path=ppt/slides/slide15.xml><?xml version="1.0" encoding="utf-8"?>
+<p:sld xmlns:a="http://schemas.openxmlformats.org/drawingml/2006/main" xmlns:r="http://schemas.openxmlformats.org/officeDocument/2006/relationships" xmlns:p="http://schemas.openxmlformats.org/presentationml/2006/main">
+  <p:cSld>
+    <p:spTree>
+      <p:nvGrpSpPr>
+        <p:cNvPr id="1" name=""/>
+        <p:cNvGrpSpPr/>
+        <p:nvPr/>
+      </p:nvGrpSpPr>
+      <p:grpSpPr/>
+      <p:sp>
+        <p:nvSpPr>
+          <p:cNvPr id="2" name="标题 1"/>
+          <p:cNvSpPr>
+            <a:spLocks noGrp="1"/>
+          </p:cNvSpPr>
+          <p:nvPr>
+            <p:ph type="ctrTitle"/>
+          </p:nvPr>
+        </p:nvSpPr>
+        <p:spPr/>
+        <p:txBody>
+          <a:bodyPr/>
+          <a:p>
+            <a:r>
+              <a:rPr lang="en-US" altLang="zh-CN"/>
+              <a:t>1.24</a:t>
+            </a:r>
+            <a:endParaRPr lang="en-US" altLang="zh-CN"/>
+          </a:p>
+        </p:txBody>
+      </p:sp>
+      <p:sp>
+        <p:nvSpPr>
+          <p:cNvPr id="3" name="副标题 2"/>
+          <p:cNvSpPr>
+            <a:spLocks noGrp="1"/>
+          </p:cNvSpPr>
+          <p:nvPr>
+            <p:ph type="subTitle" idx="1"/>
+          </p:nvPr>
+        </p:nvSpPr>
+        <p:spPr/>
+        <p:txBody>
+          <a:bodyPr/>
+          <a:p>
+            <a:endParaRPr lang="zh-CN" altLang="en-US"/>
+          </a:p>
+        </p:txBody>
+      </p:sp>
+    </p:spTree>
+  </p:cSld>
+  <p:clrMapOvr>
+    <a:masterClrMapping/>
+  </p:clrMapOvr>
+</p:sld>
+</file>
+
+<file path=ppt/slides/slide16.xml><?xml version="1.0" encoding="utf-8"?>
+<p:sld xmlns:a="http://schemas.openxmlformats.org/drawingml/2006/main" xmlns:r="http://schemas.openxmlformats.org/officeDocument/2006/relationships" xmlns:p="http://schemas.openxmlformats.org/presentationml/2006/main">
+  <p:cSld>
+    <p:spTree>
+      <p:nvGrpSpPr>
+        <p:cNvPr id="1" name=""/>
+        <p:cNvGrpSpPr/>
+        <p:nvPr/>
+      </p:nvGrpSpPr>
+      <p:grpSpPr/>
+      <p:sp>
+        <p:nvSpPr>
+          <p:cNvPr id="2" name="标题 1"/>
+          <p:cNvSpPr>
+            <a:spLocks noGrp="1"/>
+          </p:cNvSpPr>
+          <p:nvPr>
+            <p:ph type="title"/>
+          </p:nvPr>
+        </p:nvSpPr>
+        <p:spPr/>
+        <p:txBody>
+          <a:bodyPr/>
+          <a:p>
+            <a:r>
+              <a:rPr lang="zh-CN" altLang="en-US"/>
+              <a:t>新建</a:t>
+            </a:r>
+            <a:endParaRPr lang="zh-CN" altLang="en-US"/>
+          </a:p>
+        </p:txBody>
+      </p:sp>
+      <p:sp>
+        <p:nvSpPr>
+          <p:cNvPr id="3" name="内容占位符 2"/>
+          <p:cNvSpPr>
+            <a:spLocks noGrp="1"/>
+          </p:cNvSpPr>
+          <p:nvPr>
+            <p:ph idx="1"/>
+          </p:nvPr>
+        </p:nvSpPr>
+        <p:spPr/>
+        <p:txBody>
+          <a:bodyPr/>
+          <a:p>
+            <a:r>
+              <a:rPr lang="zh-CN"/>
+              <a:t>新建了</a:t>
+            </a:r>
+            <a:r>
+              <a:rPr lang="en-US" altLang="zh-CN"/>
+              <a:t>GitHub</a:t>
+            </a:r>
+            <a:r>
+              <a:rPr lang="zh-CN" altLang="en-US"/>
+              <a:t>用于版本管理</a:t>
+            </a:r>
+            <a:endParaRPr lang="zh-CN" altLang="en-US"/>
+          </a:p>
+          <a:p>
+            <a:endParaRPr lang="zh-CN" altLang="en-US"/>
+          </a:p>
+        </p:txBody>
+      </p:sp>
+    </p:spTree>
+  </p:cSld>
+  <p:clrMapOvr>
+    <a:masterClrMapping/>
+  </p:clrMapOvr>
+</p:sld>
+</file>
+
+<file path=ppt/slides/slide17.xml><?xml version="1.0" encoding="utf-8"?>
+<p:sld xmlns:a="http://schemas.openxmlformats.org/drawingml/2006/main" xmlns:r="http://schemas.openxmlformats.org/officeDocument/2006/relationships" xmlns:p="http://schemas.openxmlformats.org/presentationml/2006/main">
+  <p:cSld>
+    <p:spTree>
+      <p:nvGrpSpPr>
+        <p:cNvPr id="1" name=""/>
+        <p:cNvGrpSpPr/>
+        <p:nvPr/>
+      </p:nvGrpSpPr>
+      <p:grpSpPr/>
+      <p:sp>
+        <p:nvSpPr>
+          <p:cNvPr id="2" name="标题 1"/>
+          <p:cNvSpPr>
+            <a:spLocks noGrp="1"/>
+          </p:cNvSpPr>
+          <p:nvPr>
+            <p:ph type="title"/>
+          </p:nvPr>
+        </p:nvSpPr>
+        <p:spPr/>
+        <p:txBody>
+          <a:bodyPr/>
+          <a:p>
+            <a:r>
+              <a:rPr lang="zh-CN" altLang="en-US"/>
+              <a:t>修改</a:t>
+            </a:r>
+            <a:endParaRPr lang="zh-CN" altLang="en-US"/>
+          </a:p>
+        </p:txBody>
+      </p:sp>
+      <p:sp>
+        <p:nvSpPr>
+          <p:cNvPr id="3" name="内容占位符 2"/>
+          <p:cNvSpPr>
+            <a:spLocks noGrp="1"/>
+          </p:cNvSpPr>
+          <p:nvPr>
+            <p:ph idx="1"/>
+          </p:nvPr>
+        </p:nvSpPr>
+        <p:spPr/>
+        <p:txBody>
+          <a:bodyPr/>
+          <a:p>
+            <a:r>
+              <a:rPr lang="zh-CN"/>
+              <a:t>修改了</a:t>
+            </a:r>
+            <a:r>
+              <a:rPr lang="en-US" altLang="zh-CN"/>
+              <a:t>Agent,</a:t>
+            </a:r>
+            <a:r>
+              <a:rPr lang="zh-CN" altLang="en-US"/>
+              <a:t>可以同时操作多只股票</a:t>
+            </a:r>
+            <a:endParaRPr lang="zh-CN" altLang="en-US"/>
+          </a:p>
+          <a:p>
+            <a:r>
+              <a:rPr lang="zh-CN" altLang="en-US"/>
+              <a:t>正在添加日志功能</a:t>
+            </a:r>
+            <a:endParaRPr lang="zh-CN" altLang="en-US"/>
+          </a:p>
+        </p:txBody>
+      </p:sp>
+    </p:spTree>
+  </p:cSld>
+  <p:clrMapOvr>
+    <a:masterClrMapping/>
+  </p:clrMapOvr>
+</p:sld>
+</file>
+
+<file path=ppt/slides/slide18.xml><?xml version="1.0" encoding="utf-8"?>
+<p:sld xmlns:a="http://schemas.openxmlformats.org/drawingml/2006/main" xmlns:r="http://schemas.openxmlformats.org/officeDocument/2006/relationships" xmlns:p="http://schemas.openxmlformats.org/presentationml/2006/main">
+  <p:cSld>
+    <p:spTree>
+      <p:nvGrpSpPr>
+        <p:cNvPr id="1" name=""/>
+        <p:cNvGrpSpPr/>
+        <p:nvPr/>
+      </p:nvGrpSpPr>
+      <p:grpSpPr/>
+      <p:sp>
+        <p:nvSpPr>
+          <p:cNvPr id="2" name="标题 1"/>
+          <p:cNvSpPr>
+            <a:spLocks noGrp="1"/>
+          </p:cNvSpPr>
+          <p:nvPr>
+            <p:ph type="title"/>
+          </p:nvPr>
+        </p:nvSpPr>
+        <p:spPr/>
+        <p:txBody>
+          <a:bodyPr/>
+          <a:p>
+            <a:r>
+              <a:rPr lang="zh-CN" altLang="en-US"/>
+              <a:t>需要解决的问题</a:t>
+            </a:r>
+            <a:endParaRPr lang="zh-CN" altLang="en-US"/>
+          </a:p>
+        </p:txBody>
+      </p:sp>
+      <p:sp>
+        <p:nvSpPr>
+          <p:cNvPr id="3" name="内容占位符 2"/>
+          <p:cNvSpPr>
+            <a:spLocks noGrp="1"/>
+          </p:cNvSpPr>
+          <p:nvPr>
+            <p:ph idx="1"/>
+          </p:nvPr>
+        </p:nvSpPr>
+        <p:spPr/>
+        <p:txBody>
+          <a:bodyPr/>
+          <a:p>
+            <a:r>
+              <a:rPr lang="en-US"/>
+              <a:t>Agent</a:t>
+            </a:r>
+            <a:r>
+              <a:rPr lang="zh-CN" altLang="en-US"/>
+              <a:t>如何判断是最新的数据If_New_Data。有可能得到的是昨天的数据。</a:t>
+            </a:r>
+            <a:endParaRPr lang="zh-CN" altLang="en-US"/>
+          </a:p>
+        </p:txBody>
+      </p:sp>
+    </p:spTree>
+  </p:cSld>
+  <p:clrMapOvr>
+    <a:masterClrMapping/>
+  </p:clrMapOvr>
+</p:sld>
+</file>
+
 <file path=ppt/slides/slide2.xml><?xml version="1.0" encoding="utf-8"?>
 <p:sld xmlns:a="http://schemas.openxmlformats.org/drawingml/2006/main" xmlns:r="http://schemas.openxmlformats.org/officeDocument/2006/relationships" xmlns:p="http://schemas.openxmlformats.org/presentationml/2006/main">
   <p:cSld>

</xml_diff>

<commit_message>
Init commit version 0.3
</commit_message>
<xml_diff>
--- a/log.pptx
+++ b/log.pptx
@@ -3529,6 +3529,38 @@
             <a:endParaRPr lang="zh-CN" altLang="en-US"/>
           </a:p>
           <a:p>
+            <a:r>
+              <a:rPr lang="en-US" altLang="zh-CN"/>
+              <a:t>git checkout master</a:t>
+            </a:r>
+            <a:endParaRPr lang="en-US" altLang="zh-CN"/>
+          </a:p>
+          <a:p>
+            <a:r>
+              <a:rPr lang="en-US" altLang="zh-CN"/>
+              <a:t>git add .</a:t>
+            </a:r>
+            <a:endParaRPr lang="en-US" altLang="zh-CN"/>
+          </a:p>
+          <a:p>
+            <a:r>
+              <a:rPr lang="en-US" altLang="zh-CN"/>
+              <a:t>git commit -m “xxx”</a:t>
+            </a:r>
+            <a:endParaRPr lang="en-US" altLang="zh-CN"/>
+          </a:p>
+          <a:p>
+            <a:r>
+              <a:rPr lang="zh-CN" altLang="en-US"/>
+              <a:t>git push origin</a:t>
+            </a:r>
+            <a:r>
+              <a:rPr lang="en-US" altLang="zh-CN"/>
+              <a:t> master</a:t>
+            </a:r>
+            <a:endParaRPr lang="zh-CN" altLang="en-US"/>
+          </a:p>
+          <a:p>
             <a:endParaRPr lang="zh-CN" altLang="en-US"/>
           </a:p>
         </p:txBody>

</xml_diff>